<commit_message>
Motorisation + Point projet
</commit_message>
<xml_diff>
--- a/DR_Direction/MG_Management/10_Point_Projet/2019_2020/2019 11 05.pptx
+++ b/DR_Direction/MG_Management/10_Point_Projet/2019_2020/2019 11 05.pptx
@@ -5,54 +5,55 @@
     <p:sldMasterId id="2147483685" r:id="rId1"/>
   </p:sldMasterIdLst>
   <p:notesMasterIdLst>
-    <p:notesMasterId r:id="rId11"/>
+    <p:notesMasterId r:id="rId12"/>
   </p:notesMasterIdLst>
   <p:handoutMasterIdLst>
-    <p:handoutMasterId r:id="rId12"/>
+    <p:handoutMasterId r:id="rId13"/>
   </p:handoutMasterIdLst>
   <p:sldIdLst>
     <p:sldId id="256" r:id="rId2"/>
     <p:sldId id="257" r:id="rId3"/>
     <p:sldId id="258" r:id="rId4"/>
-    <p:sldId id="261" r:id="rId5"/>
-    <p:sldId id="262" r:id="rId6"/>
-    <p:sldId id="263" r:id="rId7"/>
-    <p:sldId id="264" r:id="rId8"/>
-    <p:sldId id="265" r:id="rId9"/>
-    <p:sldId id="259" r:id="rId10"/>
+    <p:sldId id="266" r:id="rId5"/>
+    <p:sldId id="261" r:id="rId6"/>
+    <p:sldId id="262" r:id="rId7"/>
+    <p:sldId id="263" r:id="rId8"/>
+    <p:sldId id="264" r:id="rId9"/>
+    <p:sldId id="265" r:id="rId10"/>
+    <p:sldId id="259" r:id="rId11"/>
   </p:sldIdLst>
   <p:sldSz cx="9144000" cy="5143500" type="screen16x9"/>
   <p:notesSz cx="6858000" cy="9144000"/>
   <p:embeddedFontLst>
     <p:embeddedFont>
       <p:font typeface="Arial Black" panose="020B0A04020102020204" pitchFamily="34" charset="0"/>
-      <p:bold r:id="rId13"/>
+      <p:bold r:id="rId14"/>
     </p:embeddedFont>
     <p:embeddedFont>
       <p:font typeface="Calibri" panose="020F0502020204030204" pitchFamily="34" charset="0"/>
-      <p:regular r:id="rId14"/>
-      <p:bold r:id="rId15"/>
-      <p:italic r:id="rId16"/>
-      <p:boldItalic r:id="rId17"/>
+      <p:regular r:id="rId15"/>
+      <p:bold r:id="rId16"/>
+      <p:italic r:id="rId17"/>
+      <p:boldItalic r:id="rId18"/>
     </p:embeddedFont>
     <p:embeddedFont>
       <p:font typeface="Calibri Light" panose="020F0302020204030204" pitchFamily="34" charset="0"/>
-      <p:regular r:id="rId18"/>
-      <p:italic r:id="rId19"/>
+      <p:regular r:id="rId19"/>
+      <p:italic r:id="rId20"/>
     </p:embeddedFont>
     <p:embeddedFont>
       <p:font typeface="Corbel" panose="020B0503020204020204" pitchFamily="34" charset="0"/>
-      <p:regular r:id="rId20"/>
-      <p:bold r:id="rId21"/>
-      <p:italic r:id="rId22"/>
-      <p:boldItalic r:id="rId23"/>
+      <p:regular r:id="rId21"/>
+      <p:bold r:id="rId22"/>
+      <p:italic r:id="rId23"/>
+      <p:boldItalic r:id="rId24"/>
     </p:embeddedFont>
     <p:embeddedFont>
       <p:font typeface="Open Sans" panose="020B0606030504020204" pitchFamily="34" charset="0"/>
-      <p:regular r:id="rId24"/>
-      <p:bold r:id="rId25"/>
-      <p:italic r:id="rId26"/>
-      <p:boldItalic r:id="rId27"/>
+      <p:regular r:id="rId25"/>
+      <p:bold r:id="rId26"/>
+      <p:italic r:id="rId27"/>
+      <p:boldItalic r:id="rId28"/>
     </p:embeddedFont>
   </p:embeddedFontLst>
   <p:defaultTextStyle>
@@ -10695,6 +10696,168 @@
 </p:sld>
 </file>
 
+<file path=ppt/slides/slide10.xml><?xml version="1.0" encoding="utf-8"?>
+<p:sld xmlns:a="http://schemas.openxmlformats.org/drawingml/2006/main" xmlns:r="http://schemas.openxmlformats.org/officeDocument/2006/relationships" xmlns:p="http://schemas.openxmlformats.org/presentationml/2006/main" show="0">
+  <p:cSld>
+    <p:spTree>
+      <p:nvGrpSpPr>
+        <p:cNvPr id="1" name=""/>
+        <p:cNvGrpSpPr/>
+        <p:nvPr/>
+      </p:nvGrpSpPr>
+      <p:grpSpPr>
+        <a:xfrm>
+          <a:off x="0" y="0"/>
+          <a:ext cx="0" cy="0"/>
+          <a:chOff x="0" y="0"/>
+          <a:chExt cx="0" cy="0"/>
+        </a:xfrm>
+      </p:grpSpPr>
+      <p:sp>
+        <p:nvSpPr>
+          <p:cNvPr id="2" name="Titre 1">
+            <a:extLst>
+              <a:ext uri="{FF2B5EF4-FFF2-40B4-BE49-F238E27FC236}">
+                <a16:creationId xmlns:a16="http://schemas.microsoft.com/office/drawing/2014/main" id="{FCBA1801-9487-47C3-8FCF-653CF4021936}"/>
+              </a:ext>
+            </a:extLst>
+          </p:cNvPr>
+          <p:cNvSpPr>
+            <a:spLocks noGrp="1"/>
+          </p:cNvSpPr>
+          <p:nvPr>
+            <p:ph type="title"/>
+          </p:nvPr>
+        </p:nvSpPr>
+        <p:spPr/>
+        <p:txBody>
+          <a:bodyPr/>
+          <a:lstStyle/>
+          <a:p>
+            <a:r>
+              <a:rPr lang="fr-FR" dirty="0"/>
+              <a:t>Stand Up Meeting</a:t>
+            </a:r>
+          </a:p>
+        </p:txBody>
+      </p:sp>
+      <p:sp>
+        <p:nvSpPr>
+          <p:cNvPr id="3" name="Espace réservé du contenu 2">
+            <a:extLst>
+              <a:ext uri="{FF2B5EF4-FFF2-40B4-BE49-F238E27FC236}">
+                <a16:creationId xmlns:a16="http://schemas.microsoft.com/office/drawing/2014/main" id="{811B8CA0-5FFB-46DC-839D-D3B80E433804}"/>
+              </a:ext>
+            </a:extLst>
+          </p:cNvPr>
+          <p:cNvSpPr>
+            <a:spLocks noGrp="1"/>
+          </p:cNvSpPr>
+          <p:nvPr>
+            <p:ph idx="1"/>
+          </p:nvPr>
+        </p:nvSpPr>
+        <p:spPr/>
+        <p:txBody>
+          <a:bodyPr/>
+          <a:lstStyle/>
+          <a:p>
+            <a:r>
+              <a:rPr lang="fr-FR" dirty="0"/>
+              <a:t>Durée totale : 5 min</a:t>
+            </a:r>
+          </a:p>
+          <a:p>
+            <a:r>
+              <a:rPr lang="fr-FR" dirty="0"/>
+              <a:t>Debout, pas d’ordis ni de téléphone</a:t>
+            </a:r>
+          </a:p>
+          <a:p>
+            <a:r>
+              <a:rPr lang="fr-FR" dirty="0"/>
+              <a:t>Chacun parle de :</a:t>
+            </a:r>
+          </a:p>
+          <a:p>
+            <a:pPr lvl="1"/>
+            <a:r>
+              <a:rPr lang="fr-FR" dirty="0"/>
+              <a:t>Ce qu’il a fait depuis la dernière fois</a:t>
+            </a:r>
+          </a:p>
+          <a:p>
+            <a:pPr lvl="1"/>
+            <a:r>
+              <a:rPr lang="fr-FR" dirty="0"/>
+              <a:t>Ce qu’il va faire </a:t>
+            </a:r>
+            <a:r>
+              <a:rPr lang="fr-FR" dirty="0" err="1"/>
+              <a:t>ajd</a:t>
+            </a:r>
+            <a:endParaRPr lang="fr-FR" dirty="0"/>
+          </a:p>
+          <a:p>
+            <a:pPr lvl="1"/>
+            <a:r>
+              <a:rPr lang="fr-FR" dirty="0"/>
+              <a:t>Les problèmes qu’il va rencontrer</a:t>
+            </a:r>
+          </a:p>
+        </p:txBody>
+      </p:sp>
+      <p:sp>
+        <p:nvSpPr>
+          <p:cNvPr id="4" name="Espace réservé du numéro de diapositive 3">
+            <a:extLst>
+              <a:ext uri="{FF2B5EF4-FFF2-40B4-BE49-F238E27FC236}">
+                <a16:creationId xmlns:a16="http://schemas.microsoft.com/office/drawing/2014/main" id="{32F8342F-292F-458F-9FDA-7845AC8156E5}"/>
+              </a:ext>
+            </a:extLst>
+          </p:cNvPr>
+          <p:cNvSpPr>
+            <a:spLocks noGrp="1"/>
+          </p:cNvSpPr>
+          <p:nvPr>
+            <p:ph type="sldNum" sz="quarter" idx="12"/>
+          </p:nvPr>
+        </p:nvSpPr>
+        <p:spPr/>
+        <p:txBody>
+          <a:bodyPr/>
+          <a:lstStyle/>
+          <a:p>
+            <a:pPr marL="0" lvl="0" indent="0" algn="r" rtl="0">
+              <a:spcBef>
+                <a:spcPts val="0"/>
+              </a:spcBef>
+              <a:spcAft>
+                <a:spcPts val="0"/>
+              </a:spcAft>
+              <a:buNone/>
+            </a:pPr>
+            <a:fld id="{00000000-1234-1234-1234-123412341234}" type="slidenum">
+              <a:rPr lang="fr-FR" smtClean="0"/>
+              <a:t>10</a:t>
+            </a:fld>
+            <a:endParaRPr lang="fr-FR"/>
+          </a:p>
+        </p:txBody>
+      </p:sp>
+    </p:spTree>
+    <p:extLst>
+      <p:ext uri="{BB962C8B-B14F-4D97-AF65-F5344CB8AC3E}">
+        <p14:creationId xmlns:p14="http://schemas.microsoft.com/office/powerpoint/2010/main" val="4009614938"/>
+      </p:ext>
+    </p:extLst>
+  </p:cSld>
+  <p:clrMapOvr>
+    <a:masterClrMapping/>
+  </p:clrMapOvr>
+</p:sld>
+</file>
+
 <file path=ppt/slides/slide2.xml><?xml version="1.0" encoding="utf-8"?>
 <p:sld xmlns:a="http://schemas.openxmlformats.org/drawingml/2006/main" xmlns:r="http://schemas.openxmlformats.org/officeDocument/2006/relationships" xmlns:p="http://schemas.openxmlformats.org/presentationml/2006/main">
   <p:cSld>
@@ -10848,7 +11011,7 @@
           <a:graphicData uri="http://schemas.openxmlformats.org/presentationml/2006/ole">
             <mc:AlternateContent xmlns:mc="http://schemas.openxmlformats.org/markup-compatibility/2006">
               <mc:Choice xmlns:v="urn:schemas-microsoft-com:vml" Requires="v">
-                <p:oleObj spid="_x0000_s1028" name="Worksheet" r:id="rId3" imgW="7591435" imgH="1838263" progId="Excel.Sheet.12">
+                <p:oleObj spid="_x0000_s1029" name="Worksheet" r:id="rId3" imgW="7591435" imgH="1838263" progId="Excel.Sheet.12">
                   <p:embed/>
                 </p:oleObj>
               </mc:Choice>
@@ -11042,6 +11205,130 @@
   <p:cSld>
     <p:spTree>
       <p:nvGrpSpPr>
+        <p:cNvPr id="1" name=""/>
+        <p:cNvGrpSpPr/>
+        <p:nvPr/>
+      </p:nvGrpSpPr>
+      <p:grpSpPr>
+        <a:xfrm>
+          <a:off x="0" y="0"/>
+          <a:ext cx="0" cy="0"/>
+          <a:chOff x="0" y="0"/>
+          <a:chExt cx="0" cy="0"/>
+        </a:xfrm>
+      </p:grpSpPr>
+      <p:sp>
+        <p:nvSpPr>
+          <p:cNvPr id="2" name="Titre 1">
+            <a:extLst>
+              <a:ext uri="{FF2B5EF4-FFF2-40B4-BE49-F238E27FC236}">
+                <a16:creationId xmlns:a16="http://schemas.microsoft.com/office/drawing/2014/main" id="{636F5347-47D1-4DAB-B67B-C960459299AB}"/>
+              </a:ext>
+            </a:extLst>
+          </p:cNvPr>
+          <p:cNvSpPr>
+            <a:spLocks noGrp="1"/>
+          </p:cNvSpPr>
+          <p:nvPr>
+            <p:ph type="title"/>
+          </p:nvPr>
+        </p:nvSpPr>
+        <p:spPr/>
+        <p:txBody>
+          <a:bodyPr/>
+          <a:lstStyle/>
+          <a:p>
+            <a:r>
+              <a:rPr lang="fr-FR" dirty="0"/>
+              <a:t>Prochains évènements</a:t>
+            </a:r>
+          </a:p>
+        </p:txBody>
+      </p:sp>
+      <p:sp>
+        <p:nvSpPr>
+          <p:cNvPr id="3" name="Espace réservé du contenu 2">
+            <a:extLst>
+              <a:ext uri="{FF2B5EF4-FFF2-40B4-BE49-F238E27FC236}">
+                <a16:creationId xmlns:a16="http://schemas.microsoft.com/office/drawing/2014/main" id="{A30CD9F7-BE4D-4FED-9EE4-3CD1CEF25E3E}"/>
+              </a:ext>
+            </a:extLst>
+          </p:cNvPr>
+          <p:cNvSpPr>
+            <a:spLocks noGrp="1"/>
+          </p:cNvSpPr>
+          <p:nvPr>
+            <p:ph idx="1"/>
+          </p:nvPr>
+        </p:nvSpPr>
+        <p:spPr/>
+        <p:txBody>
+          <a:bodyPr/>
+          <a:lstStyle/>
+          <a:p>
+            <a:pPr marL="0" indent="0">
+              <a:buNone/>
+            </a:pPr>
+            <a:endParaRPr lang="fr-FR" dirty="0"/>
+          </a:p>
+        </p:txBody>
+      </p:sp>
+      <p:sp>
+        <p:nvSpPr>
+          <p:cNvPr id="4" name="Espace réservé du numéro de diapositive 3">
+            <a:extLst>
+              <a:ext uri="{FF2B5EF4-FFF2-40B4-BE49-F238E27FC236}">
+                <a16:creationId xmlns:a16="http://schemas.microsoft.com/office/drawing/2014/main" id="{751F0E41-0111-4196-9DC8-5716A5536464}"/>
+              </a:ext>
+            </a:extLst>
+          </p:cNvPr>
+          <p:cNvSpPr>
+            <a:spLocks noGrp="1"/>
+          </p:cNvSpPr>
+          <p:nvPr>
+            <p:ph type="sldNum" sz="quarter" idx="12"/>
+          </p:nvPr>
+        </p:nvSpPr>
+        <p:spPr/>
+        <p:txBody>
+          <a:bodyPr/>
+          <a:lstStyle/>
+          <a:p>
+            <a:pPr marL="0" lvl="0" indent="0" algn="r" rtl="0">
+              <a:spcBef>
+                <a:spcPts val="0"/>
+              </a:spcBef>
+              <a:spcAft>
+                <a:spcPts val="0"/>
+              </a:spcAft>
+              <a:buNone/>
+            </a:pPr>
+            <a:fld id="{00000000-1234-1234-1234-123412341234}" type="slidenum">
+              <a:rPr lang="fr-FR" smtClean="0"/>
+              <a:t>4</a:t>
+            </a:fld>
+            <a:endParaRPr lang="fr-FR"/>
+          </a:p>
+        </p:txBody>
+      </p:sp>
+    </p:spTree>
+    <p:extLst>
+      <p:ext uri="{BB962C8B-B14F-4D97-AF65-F5344CB8AC3E}">
+        <p14:creationId xmlns:p14="http://schemas.microsoft.com/office/powerpoint/2010/main" val="2939436255"/>
+      </p:ext>
+    </p:extLst>
+  </p:cSld>
+  <p:clrMapOvr>
+    <a:masterClrMapping/>
+  </p:clrMapOvr>
+</p:sld>
+</file>
+
+<file path=ppt/slides/slide5.xml><?xml version="1.0" encoding="utf-8"?>
+<p:sld xmlns:a="http://schemas.openxmlformats.org/drawingml/2006/main" xmlns:r="http://schemas.openxmlformats.org/officeDocument/2006/relationships" xmlns:p="http://schemas.openxmlformats.org/presentationml/2006/main" show="0">
+  <p:cSld>
+    <p:spTree>
+      <p:nvGrpSpPr>
         <p:cNvPr id="1" name="Shape 99"/>
         <p:cNvGrpSpPr/>
         <p:nvPr/>
@@ -11126,7 +11413,7 @@
               <a:pPr>
                 <a:buSzPts val="1200"/>
               </a:pPr>
-              <a:t>4</a:t>
+              <a:t>5</a:t>
             </a:fld>
             <a:endParaRPr/>
           </a:p>
@@ -11562,7 +11849,7 @@
                         <a:buNone/>
                       </a:pPr>
                       <a:r>
-                        <a:rPr lang="fr-FR" sz="1400" b="1">
+                        <a:rPr lang="fr-FR" sz="1400" b="1" dirty="0">
                           <a:solidFill>
                             <a:schemeClr val="dk1"/>
                           </a:solidFill>
@@ -11576,7 +11863,7 @@
                         </a:rPr>
                         <a:t>⬊➞⬈</a:t>
                       </a:r>
-                      <a:endParaRPr sz="1400" b="1">
+                      <a:endParaRPr sz="1400" b="1" dirty="0">
                         <a:highlight>
                           <a:srgbClr val="00B050"/>
                         </a:highlight>
@@ -12113,8 +12400,8 @@
 </p:sld>
 </file>
 
-<file path=ppt/slides/slide5.xml><?xml version="1.0" encoding="utf-8"?>
-<p:sld xmlns:a="http://schemas.openxmlformats.org/drawingml/2006/main" xmlns:r="http://schemas.openxmlformats.org/officeDocument/2006/relationships" xmlns:p="http://schemas.openxmlformats.org/presentationml/2006/main">
+<file path=ppt/slides/slide6.xml><?xml version="1.0" encoding="utf-8"?>
+<p:sld xmlns:a="http://schemas.openxmlformats.org/drawingml/2006/main" xmlns:r="http://schemas.openxmlformats.org/officeDocument/2006/relationships" xmlns:p="http://schemas.openxmlformats.org/presentationml/2006/main" show="0">
   <p:cSld>
     <p:spTree>
       <p:nvGrpSpPr>
@@ -12202,7 +12489,7 @@
               <a:pPr>
                 <a:buSzPts val="1200"/>
               </a:pPr>
-              <a:t>5</a:t>
+              <a:t>6</a:t>
             </a:fld>
             <a:endParaRPr/>
           </a:p>
@@ -13037,8 +13324,8 @@
 </p:sld>
 </file>
 
-<file path=ppt/slides/slide6.xml><?xml version="1.0" encoding="utf-8"?>
-<p:sld xmlns:a="http://schemas.openxmlformats.org/drawingml/2006/main" xmlns:r="http://schemas.openxmlformats.org/officeDocument/2006/relationships" xmlns:p="http://schemas.openxmlformats.org/presentationml/2006/main">
+<file path=ppt/slides/slide7.xml><?xml version="1.0" encoding="utf-8"?>
+<p:sld xmlns:a="http://schemas.openxmlformats.org/drawingml/2006/main" xmlns:r="http://schemas.openxmlformats.org/officeDocument/2006/relationships" xmlns:p="http://schemas.openxmlformats.org/presentationml/2006/main" show="0">
   <p:cSld>
     <p:spTree>
       <p:nvGrpSpPr>
@@ -13126,7 +13413,7 @@
               <a:pPr>
                 <a:buSzPts val="1200"/>
               </a:pPr>
-              <a:t>6</a:t>
+              <a:t>7</a:t>
             </a:fld>
             <a:endParaRPr/>
           </a:p>
@@ -13731,8 +14018,8 @@
 </p:sld>
 </file>
 
-<file path=ppt/slides/slide7.xml><?xml version="1.0" encoding="utf-8"?>
-<p:sld xmlns:a="http://schemas.openxmlformats.org/drawingml/2006/main" xmlns:r="http://schemas.openxmlformats.org/officeDocument/2006/relationships" xmlns:p="http://schemas.openxmlformats.org/presentationml/2006/main">
+<file path=ppt/slides/slide8.xml><?xml version="1.0" encoding="utf-8"?>
+<p:sld xmlns:a="http://schemas.openxmlformats.org/drawingml/2006/main" xmlns:r="http://schemas.openxmlformats.org/officeDocument/2006/relationships" xmlns:p="http://schemas.openxmlformats.org/presentationml/2006/main" show="0">
   <p:cSld>
     <p:spTree>
       <p:nvGrpSpPr>
@@ -13820,7 +14107,7 @@
               <a:pPr>
                 <a:buSzPts val="1200"/>
               </a:pPr>
-              <a:t>7</a:t>
+              <a:t>8</a:t>
             </a:fld>
             <a:endParaRPr/>
           </a:p>
@@ -14898,8 +15185,8 @@
 </p:sld>
 </file>
 
-<file path=ppt/slides/slide8.xml><?xml version="1.0" encoding="utf-8"?>
-<p:sld xmlns:a="http://schemas.openxmlformats.org/drawingml/2006/main" xmlns:r="http://schemas.openxmlformats.org/officeDocument/2006/relationships" xmlns:p="http://schemas.openxmlformats.org/presentationml/2006/main">
+<file path=ppt/slides/slide9.xml><?xml version="1.0" encoding="utf-8"?>
+<p:sld xmlns:a="http://schemas.openxmlformats.org/drawingml/2006/main" xmlns:r="http://schemas.openxmlformats.org/officeDocument/2006/relationships" xmlns:p="http://schemas.openxmlformats.org/presentationml/2006/main" show="0">
   <p:cSld>
     <p:spTree>
       <p:nvGrpSpPr>
@@ -14987,7 +15274,7 @@
               <a:pPr>
                 <a:buSzPts val="1200"/>
               </a:pPr>
-              <a:t>8</a:t>
+              <a:t>9</a:t>
             </a:fld>
             <a:endParaRPr/>
           </a:p>
@@ -15876,168 +16163,6 @@
         </a:graphic>
       </p:graphicFrame>
     </p:spTree>
-  </p:cSld>
-  <p:clrMapOvr>
-    <a:masterClrMapping/>
-  </p:clrMapOvr>
-</p:sld>
-</file>
-
-<file path=ppt/slides/slide9.xml><?xml version="1.0" encoding="utf-8"?>
-<p:sld xmlns:a="http://schemas.openxmlformats.org/drawingml/2006/main" xmlns:r="http://schemas.openxmlformats.org/officeDocument/2006/relationships" xmlns:p="http://schemas.openxmlformats.org/presentationml/2006/main" show="0">
-  <p:cSld>
-    <p:spTree>
-      <p:nvGrpSpPr>
-        <p:cNvPr id="1" name=""/>
-        <p:cNvGrpSpPr/>
-        <p:nvPr/>
-      </p:nvGrpSpPr>
-      <p:grpSpPr>
-        <a:xfrm>
-          <a:off x="0" y="0"/>
-          <a:ext cx="0" cy="0"/>
-          <a:chOff x="0" y="0"/>
-          <a:chExt cx="0" cy="0"/>
-        </a:xfrm>
-      </p:grpSpPr>
-      <p:sp>
-        <p:nvSpPr>
-          <p:cNvPr id="2" name="Titre 1">
-            <a:extLst>
-              <a:ext uri="{FF2B5EF4-FFF2-40B4-BE49-F238E27FC236}">
-                <a16:creationId xmlns:a16="http://schemas.microsoft.com/office/drawing/2014/main" id="{FCBA1801-9487-47C3-8FCF-653CF4021936}"/>
-              </a:ext>
-            </a:extLst>
-          </p:cNvPr>
-          <p:cNvSpPr>
-            <a:spLocks noGrp="1"/>
-          </p:cNvSpPr>
-          <p:nvPr>
-            <p:ph type="title"/>
-          </p:nvPr>
-        </p:nvSpPr>
-        <p:spPr/>
-        <p:txBody>
-          <a:bodyPr/>
-          <a:lstStyle/>
-          <a:p>
-            <a:r>
-              <a:rPr lang="fr-FR" dirty="0"/>
-              <a:t>Stand Up Meeting</a:t>
-            </a:r>
-          </a:p>
-        </p:txBody>
-      </p:sp>
-      <p:sp>
-        <p:nvSpPr>
-          <p:cNvPr id="3" name="Espace réservé du contenu 2">
-            <a:extLst>
-              <a:ext uri="{FF2B5EF4-FFF2-40B4-BE49-F238E27FC236}">
-                <a16:creationId xmlns:a16="http://schemas.microsoft.com/office/drawing/2014/main" id="{811B8CA0-5FFB-46DC-839D-D3B80E433804}"/>
-              </a:ext>
-            </a:extLst>
-          </p:cNvPr>
-          <p:cNvSpPr>
-            <a:spLocks noGrp="1"/>
-          </p:cNvSpPr>
-          <p:nvPr>
-            <p:ph idx="1"/>
-          </p:nvPr>
-        </p:nvSpPr>
-        <p:spPr/>
-        <p:txBody>
-          <a:bodyPr/>
-          <a:lstStyle/>
-          <a:p>
-            <a:r>
-              <a:rPr lang="fr-FR" dirty="0"/>
-              <a:t>Durée totale : 5 min</a:t>
-            </a:r>
-          </a:p>
-          <a:p>
-            <a:r>
-              <a:rPr lang="fr-FR" dirty="0"/>
-              <a:t>Debout, pas d’ordis ni de téléphone</a:t>
-            </a:r>
-          </a:p>
-          <a:p>
-            <a:r>
-              <a:rPr lang="fr-FR" dirty="0"/>
-              <a:t>Chacun parle de :</a:t>
-            </a:r>
-          </a:p>
-          <a:p>
-            <a:pPr lvl="1"/>
-            <a:r>
-              <a:rPr lang="fr-FR" dirty="0"/>
-              <a:t>Ce qu’il a fait depuis la dernière fois</a:t>
-            </a:r>
-          </a:p>
-          <a:p>
-            <a:pPr lvl="1"/>
-            <a:r>
-              <a:rPr lang="fr-FR" dirty="0"/>
-              <a:t>Ce qu’il va faire </a:t>
-            </a:r>
-            <a:r>
-              <a:rPr lang="fr-FR" dirty="0" err="1"/>
-              <a:t>ajd</a:t>
-            </a:r>
-            <a:endParaRPr lang="fr-FR" dirty="0"/>
-          </a:p>
-          <a:p>
-            <a:pPr lvl="1"/>
-            <a:r>
-              <a:rPr lang="fr-FR" dirty="0"/>
-              <a:t>Les problèmes qu’il va rencontrer</a:t>
-            </a:r>
-          </a:p>
-        </p:txBody>
-      </p:sp>
-      <p:sp>
-        <p:nvSpPr>
-          <p:cNvPr id="4" name="Espace réservé du numéro de diapositive 3">
-            <a:extLst>
-              <a:ext uri="{FF2B5EF4-FFF2-40B4-BE49-F238E27FC236}">
-                <a16:creationId xmlns:a16="http://schemas.microsoft.com/office/drawing/2014/main" id="{32F8342F-292F-458F-9FDA-7845AC8156E5}"/>
-              </a:ext>
-            </a:extLst>
-          </p:cNvPr>
-          <p:cNvSpPr>
-            <a:spLocks noGrp="1"/>
-          </p:cNvSpPr>
-          <p:nvPr>
-            <p:ph type="sldNum" sz="quarter" idx="12"/>
-          </p:nvPr>
-        </p:nvSpPr>
-        <p:spPr/>
-        <p:txBody>
-          <a:bodyPr/>
-          <a:lstStyle/>
-          <a:p>
-            <a:pPr marL="0" lvl="0" indent="0" algn="r" rtl="0">
-              <a:spcBef>
-                <a:spcPts val="0"/>
-              </a:spcBef>
-              <a:spcAft>
-                <a:spcPts val="0"/>
-              </a:spcAft>
-              <a:buNone/>
-            </a:pPr>
-            <a:fld id="{00000000-1234-1234-1234-123412341234}" type="slidenum">
-              <a:rPr lang="fr-FR" smtClean="0"/>
-              <a:t>9</a:t>
-            </a:fld>
-            <a:endParaRPr lang="fr-FR"/>
-          </a:p>
-        </p:txBody>
-      </p:sp>
-    </p:spTree>
-    <p:extLst>
-      <p:ext uri="{BB962C8B-B14F-4D97-AF65-F5344CB8AC3E}">
-        <p14:creationId xmlns:p14="http://schemas.microsoft.com/office/powerpoint/2010/main" val="4009614938"/>
-      </p:ext>
-    </p:extLst>
   </p:cSld>
   <p:clrMapOvr>
     <a:masterClrMapping/>

</xml_diff>